<commit_message>
Update Stochastic Gradient Descent Algorithm.pptx
</commit_message>
<xml_diff>
--- a/slides/Stochastic Gradient Descent Algorithm.pptx
+++ b/slides/Stochastic Gradient Descent Algorithm.pptx
@@ -7167,7 +7167,12 @@
             <p:ph type="title"/>
           </p:nvPr>
         </p:nvSpPr>
-        <p:spPr/>
+        <p:spPr>
+          <a:xfrm>
+            <a:off x="838200" y="0"/>
+            <a:ext cx="10515600" cy="1325563"/>
+          </a:xfrm>
+        </p:spPr>
         <p:txBody>
           <a:bodyPr>
             <a:normAutofit/>
@@ -7204,7 +7209,12 @@
             <p:ph idx="1"/>
           </p:nvPr>
         </p:nvSpPr>
-        <p:spPr/>
+        <p:spPr>
+          <a:xfrm>
+            <a:off x="222582" y="971730"/>
+            <a:ext cx="11746835" cy="4351338"/>
+          </a:xfrm>
+        </p:spPr>
         <p:txBody>
           <a:bodyPr/>
           <a:lstStyle/>
@@ -7245,7 +7255,7 @@
         </p:nvSpPr>
         <p:spPr>
           <a:xfrm>
-            <a:off x="316829" y="4101287"/>
+            <a:off x="483267" y="2951946"/>
             <a:ext cx="11225464" cy="954107"/>
           </a:xfrm>
           <a:prstGeom prst="rect">
@@ -7307,8 +7317,8 @@
         </p:nvSpPr>
         <p:spPr>
           <a:xfrm>
-            <a:off x="1187116" y="3564494"/>
-            <a:ext cx="7996990" cy="369332"/>
+            <a:off x="641685" y="2344093"/>
+            <a:ext cx="9946104" cy="461665"/>
           </a:xfrm>
           <a:prstGeom prst="rect">
             <a:avLst/>
@@ -7322,18 +7332,48 @@
           <a:lstStyle/>
           <a:p>
             <a:r>
-              <a:rPr lang="en-US" dirty="0">
+              <a:rPr lang="en-US" sz="2400" dirty="0">
                 <a:hlinkClick r:id="rId2"/>
               </a:rPr>
               <a:t>https://www.mathsisfun.com/calculus/derivatives-introduction.html</a:t>
             </a:r>
             <a:r>
-              <a:rPr lang="en-US" dirty="0"/>
+              <a:rPr lang="en-US" sz="2400" dirty="0"/>
               <a:t> </a:t>
             </a:r>
           </a:p>
         </p:txBody>
       </p:sp>
+      <p:pic>
+        <p:nvPicPr>
+          <p:cNvPr id="6" name="Picture 5">
+            <a:extLst>
+              <a:ext uri="{FF2B5EF4-FFF2-40B4-BE49-F238E27FC236}">
+                <a16:creationId xmlns:a16="http://schemas.microsoft.com/office/drawing/2014/main" id="{7E39CF24-56AB-45A3-80C4-026FA110BE7B}"/>
+              </a:ext>
+            </a:extLst>
+          </p:cNvPr>
+          <p:cNvPicPr>
+            <a:picLocks noChangeAspect="1"/>
+          </p:cNvPicPr>
+          <p:nvPr/>
+        </p:nvPicPr>
+        <p:blipFill>
+          <a:blip r:embed="rId3"/>
+          <a:stretch>
+            <a:fillRect/>
+          </a:stretch>
+        </p:blipFill>
+        <p:spPr>
+          <a:xfrm>
+            <a:off x="8995749" y="3942696"/>
+            <a:ext cx="2712982" cy="2747764"/>
+          </a:xfrm>
+          <a:prstGeom prst="rect">
+            <a:avLst/>
+          </a:prstGeom>
+        </p:spPr>
+      </p:pic>
     </p:spTree>
     <p:extLst>
       <p:ext uri="{BB962C8B-B14F-4D97-AF65-F5344CB8AC3E}">
@@ -7380,12 +7420,38 @@
             <p:ph type="title"/>
           </p:nvPr>
         </p:nvSpPr>
-        <p:spPr/>
+        <p:spPr>
+          <a:xfrm>
+            <a:off x="661737" y="0"/>
+            <a:ext cx="10515600" cy="818147"/>
+          </a:xfrm>
+        </p:spPr>
         <p:txBody>
           <a:bodyPr/>
           <a:lstStyle/>
           <a:p>
-            <a:endParaRPr lang="ar-PS"/>
+            <a:r>
+              <a:rPr lang="en-US" b="0" i="0" dirty="0">
+                <a:solidFill>
+                  <a:srgbClr val="222222"/>
+                </a:solidFill>
+                <a:effectLst/>
+                <a:latin typeface="source sans pro" panose="020B0503030403020204" pitchFamily="34" charset="0"/>
+              </a:rPr>
+              <a:t> </a:t>
+            </a:r>
+            <a:r>
+              <a:rPr lang="en-US" b="0" i="0" u="none" strike="noStrike" dirty="0">
+                <a:solidFill>
+                  <a:srgbClr val="619CCD"/>
+                </a:solidFill>
+                <a:effectLst/>
+                <a:latin typeface="source sans pro" panose="020B0503030403020204" pitchFamily="34" charset="0"/>
+                <a:hlinkClick r:id="rId2"/>
+              </a:rPr>
+              <a:t>𝑣₁² + 𝑣₂⁴</a:t>
+            </a:r>
+            <a:endParaRPr lang="ar-PS" dirty="0"/>
           </a:p>
         </p:txBody>
       </p:sp>
@@ -7405,12 +7471,186 @@
             <p:ph idx="1"/>
           </p:nvPr>
         </p:nvSpPr>
-        <p:spPr/>
+        <p:spPr>
+          <a:xfrm>
+            <a:off x="517358" y="1057731"/>
+            <a:ext cx="10515600" cy="818147"/>
+          </a:xfrm>
+        </p:spPr>
         <p:txBody>
           <a:bodyPr/>
           <a:lstStyle/>
           <a:p>
-            <a:endParaRPr lang="ar-PS"/>
+            <a:r>
+              <a:rPr lang="en-US" b="0" i="0" dirty="0">
+                <a:solidFill>
+                  <a:srgbClr val="222222"/>
+                </a:solidFill>
+                <a:effectLst/>
+                <a:latin typeface="source sans pro" panose="020B0503030403020204" pitchFamily="34" charset="0"/>
+              </a:rPr>
+              <a:t> </a:t>
+            </a:r>
+            <a:r>
+              <a:rPr lang="en-US" b="0" i="0" u="none" strike="noStrike" dirty="0">
+                <a:solidFill>
+                  <a:srgbClr val="619CCD"/>
+                </a:solidFill>
+                <a:effectLst/>
+                <a:latin typeface="source sans pro" panose="020B0503030403020204" pitchFamily="34" charset="0"/>
+                <a:hlinkClick r:id="rId2"/>
+              </a:rPr>
+              <a:t>𝑣₁² + 𝑣₂⁴</a:t>
+            </a:r>
+            <a:r>
+              <a:rPr lang="en-US" b="0" i="0" dirty="0">
+                <a:solidFill>
+                  <a:srgbClr val="222222"/>
+                </a:solidFill>
+                <a:effectLst/>
+                <a:latin typeface="source sans pro" panose="020B0503030403020204" pitchFamily="34" charset="0"/>
+              </a:rPr>
+              <a:t> that has the gradient vector (2𝑣₁, 4𝑣₂³)</a:t>
+            </a:r>
+            <a:endParaRPr lang="ar-PS" dirty="0"/>
+          </a:p>
+        </p:txBody>
+      </p:sp>
+      <p:sp>
+        <p:nvSpPr>
+          <p:cNvPr id="8" name="TextBox 7">
+            <a:extLst>
+              <a:ext uri="{FF2B5EF4-FFF2-40B4-BE49-F238E27FC236}">
+                <a16:creationId xmlns:a16="http://schemas.microsoft.com/office/drawing/2014/main" id="{3F91C901-0DD7-47EA-B743-B77C5D2F4F9C}"/>
+              </a:ext>
+            </a:extLst>
+          </p:cNvPr>
+          <p:cNvSpPr txBox="1"/>
+          <p:nvPr/>
+        </p:nvSpPr>
+        <p:spPr>
+          <a:xfrm>
+            <a:off x="280736" y="1660016"/>
+            <a:ext cx="11630527" cy="2062103"/>
+          </a:xfrm>
+          <a:prstGeom prst="rect">
+            <a:avLst/>
+          </a:prstGeom>
+          <a:noFill/>
+          <a:ln>
+            <a:solidFill>
+              <a:schemeClr val="accent1"/>
+            </a:solidFill>
+          </a:ln>
+        </p:spPr>
+        <p:txBody>
+          <a:bodyPr wrap="square">
+            <a:spAutoFit/>
+          </a:bodyPr>
+          <a:lstStyle/>
+          <a:p>
+            <a:r>
+              <a:rPr lang="en-US" sz="3200" dirty="0"/>
+              <a:t>&gt;&gt;&gt; </a:t>
+            </a:r>
+            <a:r>
+              <a:rPr lang="en-US" sz="3200" dirty="0" err="1"/>
+              <a:t>gradient_descent</a:t>
+            </a:r>
+            <a:r>
+              <a:rPr lang="en-US" sz="3200" dirty="0"/>
+              <a:t>(</a:t>
+            </a:r>
+          </a:p>
+          <a:p>
+            <a:r>
+              <a:rPr lang="en-US" sz="3200" dirty="0"/>
+              <a:t>...     gradient=lambda v: </a:t>
+            </a:r>
+            <a:r>
+              <a:rPr lang="en-US" sz="3200" dirty="0" err="1"/>
+              <a:t>np.array</a:t>
+            </a:r>
+            <a:r>
+              <a:rPr lang="en-US" sz="3200" dirty="0"/>
+              <a:t>([2 * v[0], 4 * v[1]**3]),</a:t>
+            </a:r>
+          </a:p>
+          <a:p>
+            <a:r>
+              <a:rPr lang="en-US" sz="3200" dirty="0"/>
+              <a:t>...     start=</a:t>
+            </a:r>
+            <a:r>
+              <a:rPr lang="en-US" sz="3200" dirty="0" err="1"/>
+              <a:t>np.array</a:t>
+            </a:r>
+            <a:r>
+              <a:rPr lang="en-US" sz="3200" dirty="0"/>
+              <a:t>([1.0, 1.0]), </a:t>
+            </a:r>
+            <a:r>
+              <a:rPr lang="en-US" sz="3200" dirty="0" err="1"/>
+              <a:t>learn_rate</a:t>
+            </a:r>
+            <a:r>
+              <a:rPr lang="en-US" sz="3200" dirty="0"/>
+              <a:t>=0.2, tolerance=1e-08)</a:t>
+            </a:r>
+          </a:p>
+          <a:p>
+            <a:r>
+              <a:rPr lang="en-US" sz="3200" dirty="0"/>
+              <a:t>array([8.08281277e-12, 9.75207120e-02])</a:t>
+            </a:r>
+          </a:p>
+        </p:txBody>
+      </p:sp>
+      <p:sp>
+        <p:nvSpPr>
+          <p:cNvPr id="11" name="TextBox 10">
+            <a:extLst>
+              <a:ext uri="{FF2B5EF4-FFF2-40B4-BE49-F238E27FC236}">
+                <a16:creationId xmlns:a16="http://schemas.microsoft.com/office/drawing/2014/main" id="{4B07C145-32E2-48D6-B547-B991C178B938}"/>
+              </a:ext>
+            </a:extLst>
+          </p:cNvPr>
+          <p:cNvSpPr txBox="1"/>
+          <p:nvPr/>
+        </p:nvSpPr>
+        <p:spPr>
+          <a:xfrm>
+            <a:off x="280736" y="4563988"/>
+            <a:ext cx="11349790" cy="1815882"/>
+          </a:xfrm>
+          <a:prstGeom prst="rect">
+            <a:avLst/>
+          </a:prstGeom>
+          <a:noFill/>
+          <a:ln>
+            <a:solidFill>
+              <a:schemeClr val="accent1"/>
+            </a:solidFill>
+          </a:ln>
+        </p:spPr>
+        <p:txBody>
+          <a:bodyPr wrap="square">
+            <a:spAutoFit/>
+          </a:bodyPr>
+          <a:lstStyle/>
+          <a:p>
+            <a:r>
+              <a:rPr lang="en-US" sz="2800" dirty="0"/>
+              <a:t>in this case, your gradient function returns an array, and the start value is an array, so you get an array as the result. The resulting values are almost equal to zero, so you can say that </a:t>
+            </a:r>
+            <a:r>
+              <a:rPr lang="en-US" sz="2800" dirty="0" err="1"/>
+              <a:t>gradient_descent</a:t>
+            </a:r>
+            <a:r>
+              <a:rPr lang="en-US" sz="2800" dirty="0"/>
+              <a:t>() correctly found that the minimum of this function is at 𝑣₁ = 𝑣₂ = 0.</a:t>
+            </a:r>
           </a:p>
         </p:txBody>
       </p:sp>
@@ -7462,35 +7702,109 @@
         </p:nvSpPr>
         <p:spPr/>
         <p:txBody>
+          <a:bodyPr>
+            <a:normAutofit/>
+          </a:bodyPr>
+          <a:lstStyle/>
+          <a:p>
+            <a:r>
+              <a:rPr lang="en-US" b="0" i="0" dirty="0">
+                <a:solidFill>
+                  <a:srgbClr val="222222"/>
+                </a:solidFill>
+                <a:effectLst/>
+                <a:latin typeface="source sans pro" panose="020B0503030403020204" pitchFamily="34" charset="0"/>
+              </a:rPr>
+              <a:t>Ordinary Least Squares</a:t>
+            </a:r>
+            <a:endParaRPr lang="ar-PS" dirty="0"/>
+          </a:p>
+        </p:txBody>
+      </p:sp>
+      <p:sp>
+        <p:nvSpPr>
+          <p:cNvPr id="3" name="عنصر نائب للمحتوى 2">
+            <a:extLst>
+              <a:ext uri="{FF2B5EF4-FFF2-40B4-BE49-F238E27FC236}">
+                <a16:creationId xmlns:a16="http://schemas.microsoft.com/office/drawing/2014/main" id="{B45F38F5-69B9-4D22-B485-975B8B7AAAD4}"/>
+              </a:ext>
+            </a:extLst>
+          </p:cNvPr>
+          <p:cNvSpPr>
+            <a:spLocks noGrp="1"/>
+          </p:cNvSpPr>
+          <p:nvPr>
+            <p:ph idx="1"/>
+          </p:nvPr>
+        </p:nvSpPr>
+        <p:spPr>
+          <a:xfrm>
+            <a:off x="320843" y="1825625"/>
+            <a:ext cx="11502190" cy="4351338"/>
+          </a:xfrm>
+        </p:spPr>
+        <p:txBody>
           <a:bodyPr/>
           <a:lstStyle/>
           <a:p>
-            <a:endParaRPr lang="ar-PS"/>
-          </a:p>
-        </p:txBody>
-      </p:sp>
-      <p:sp>
-        <p:nvSpPr>
-          <p:cNvPr id="3" name="عنصر نائب للمحتوى 2">
-            <a:extLst>
-              <a:ext uri="{FF2B5EF4-FFF2-40B4-BE49-F238E27FC236}">
-                <a16:creationId xmlns:a16="http://schemas.microsoft.com/office/drawing/2014/main" id="{B45F38F5-69B9-4D22-B485-975B8B7AAAD4}"/>
-              </a:ext>
-            </a:extLst>
-          </p:cNvPr>
-          <p:cNvSpPr>
-            <a:spLocks noGrp="1"/>
-          </p:cNvSpPr>
-          <p:nvPr>
-            <p:ph idx="1"/>
-          </p:nvPr>
-        </p:nvSpPr>
-        <p:spPr/>
-        <p:txBody>
-          <a:bodyPr/>
-          <a:lstStyle/>
-          <a:p>
-            <a:endParaRPr lang="ar-PS"/>
+            <a:pPr algn="l"/>
+            <a:r>
+              <a:rPr lang="en-US" b="0" i="0" dirty="0">
+                <a:solidFill>
+                  <a:srgbClr val="222222"/>
+                </a:solidFill>
+                <a:effectLst/>
+                <a:latin typeface="source sans pro" panose="020B0503030403020204" pitchFamily="34" charset="0"/>
+              </a:rPr>
+              <a:t>As you’ve already learned, linear regression and the </a:t>
+            </a:r>
+            <a:r>
+              <a:rPr lang="en-US" b="0" i="0" u="none" strike="noStrike" dirty="0">
+                <a:solidFill>
+                  <a:srgbClr val="619CCD"/>
+                </a:solidFill>
+                <a:effectLst/>
+                <a:latin typeface="source sans pro" panose="020B0503030403020204" pitchFamily="34" charset="0"/>
+                <a:hlinkClick r:id="rId2"/>
+              </a:rPr>
+              <a:t>ordinary least squares method</a:t>
+            </a:r>
+            <a:r>
+              <a:rPr lang="en-US" b="0" i="0" dirty="0">
+                <a:solidFill>
+                  <a:srgbClr val="222222"/>
+                </a:solidFill>
+                <a:effectLst/>
+                <a:latin typeface="source sans pro" panose="020B0503030403020204" pitchFamily="34" charset="0"/>
+              </a:rPr>
+              <a:t> start with the observed values of the inputs 𝐱 = (𝑥₁, …, 𝑥ᵣ) and outputs 𝑦. They define a linear function 𝑓(𝐱) = 𝑏₀ + 𝑏₁𝑥₁ + ⋯ + 𝑏ᵣ𝑥ᵣ, which is as close as possible to 𝑦.</a:t>
+            </a:r>
+          </a:p>
+          <a:p>
+            <a:pPr algn="l"/>
+            <a:r>
+              <a:rPr lang="en-US" b="0" i="0" dirty="0">
+                <a:solidFill>
+                  <a:srgbClr val="222222"/>
+                </a:solidFill>
+                <a:effectLst/>
+                <a:latin typeface="source sans pro" panose="020B0503030403020204" pitchFamily="34" charset="0"/>
+              </a:rPr>
+              <a:t>This is an optimization problem. It finds the values of weights 𝑏₀, 𝑏₁, …, 𝑏ᵣ that minimize the sum of squared residuals SSR = Σᵢ(𝑦ᵢ − 𝑓(𝐱ᵢ))² or the mean squared error MSE = SSR / 𝑛. Here, 𝑛 is the total number of observations and 𝑖 = 1, …, 𝑛.</a:t>
+            </a:r>
+          </a:p>
+          <a:p>
+            <a:pPr algn="l"/>
+            <a:r>
+              <a:rPr lang="en-US" b="0" i="0" dirty="0">
+                <a:solidFill>
+                  <a:srgbClr val="222222"/>
+                </a:solidFill>
+                <a:effectLst/>
+                <a:latin typeface="source sans pro" panose="020B0503030403020204" pitchFamily="34" charset="0"/>
+              </a:rPr>
+              <a:t>You can also use the cost function 𝐶 = SSR / (2𝑛), which is mathematically more convenient than SSR or MSE.</a:t>
+            </a:r>
           </a:p>
         </p:txBody>
       </p:sp>
@@ -7540,12 +7854,27 @@
             <p:ph type="title"/>
           </p:nvPr>
         </p:nvSpPr>
-        <p:spPr/>
+        <p:spPr>
+          <a:xfrm>
+            <a:off x="838199" y="0"/>
+            <a:ext cx="10515600" cy="818147"/>
+          </a:xfrm>
+        </p:spPr>
         <p:txBody>
           <a:bodyPr/>
           <a:lstStyle/>
           <a:p>
-            <a:endParaRPr lang="ar-PS"/>
+            <a:r>
+              <a:rPr lang="en-US" b="0" i="0" dirty="0">
+                <a:solidFill>
+                  <a:srgbClr val="222222"/>
+                </a:solidFill>
+                <a:effectLst/>
+                <a:latin typeface="source sans pro" panose="020B0503030403020204" pitchFamily="34" charset="0"/>
+              </a:rPr>
+              <a:t>Ordinary Least Squares</a:t>
+            </a:r>
+            <a:endParaRPr lang="ar-PS" dirty="0"/>
           </a:p>
         </p:txBody>
       </p:sp>
@@ -7565,12 +7894,263 @@
             <p:ph idx="1"/>
           </p:nvPr>
         </p:nvSpPr>
-        <p:spPr/>
+        <p:spPr>
+          <a:xfrm>
+            <a:off x="288758" y="930442"/>
+            <a:ext cx="11662610" cy="5246521"/>
+          </a:xfrm>
+        </p:spPr>
         <p:txBody>
           <a:bodyPr/>
           <a:lstStyle/>
           <a:p>
-            <a:endParaRPr lang="ar-PS"/>
+            <a:pPr algn="l"/>
+            <a:r>
+              <a:rPr lang="en-US" b="0" i="0" dirty="0">
+                <a:solidFill>
+                  <a:srgbClr val="222222"/>
+                </a:solidFill>
+                <a:effectLst/>
+                <a:latin typeface="source sans pro" panose="020B0503030403020204" pitchFamily="34" charset="0"/>
+              </a:rPr>
+              <a:t>First, you need calculus to find the gradient of the cost function 𝐶 = </a:t>
+            </a:r>
+            <a:r>
+              <a:rPr lang="el-GR" b="0" i="0" dirty="0">
+                <a:solidFill>
+                  <a:srgbClr val="222222"/>
+                </a:solidFill>
+                <a:effectLst/>
+                <a:latin typeface="source sans pro" panose="020B0503030403020204" pitchFamily="34" charset="0"/>
+              </a:rPr>
+              <a:t>Σ</a:t>
+            </a:r>
+            <a:r>
+              <a:rPr lang="en-US" b="0" i="0" dirty="0">
+                <a:solidFill>
+                  <a:srgbClr val="222222"/>
+                </a:solidFill>
+                <a:effectLst/>
+                <a:latin typeface="source sans pro" panose="020B0503030403020204" pitchFamily="34" charset="0"/>
+              </a:rPr>
+              <a:t>ᵢ(𝑦ᵢ − 𝑏₀ − 𝑏₁𝑥ᵢ)² / (2𝑛). Since you have two decision variables, 𝑏₀ and 𝑏₁, the gradient ∇𝐶 is a vector with two components:</a:t>
+            </a:r>
+          </a:p>
+          <a:p>
+            <a:pPr lvl="1">
+              <a:buFont typeface="+mj-lt"/>
+              <a:buAutoNum type="arabicPeriod"/>
+            </a:pPr>
+            <a:r>
+              <a:rPr lang="en-US" b="0" i="0" dirty="0">
+                <a:solidFill>
+                  <a:srgbClr val="222222"/>
+                </a:solidFill>
+                <a:effectLst/>
+                <a:latin typeface="source sans pro" panose="020B0503030403020204" pitchFamily="34" charset="0"/>
+              </a:rPr>
+              <a:t>∂𝐶/∂𝑏₀ = (1/𝑛) </a:t>
+            </a:r>
+            <a:r>
+              <a:rPr lang="el-GR" b="0" i="0" dirty="0">
+                <a:solidFill>
+                  <a:srgbClr val="222222"/>
+                </a:solidFill>
+                <a:effectLst/>
+                <a:latin typeface="source sans pro" panose="020B0503030403020204" pitchFamily="34" charset="0"/>
+              </a:rPr>
+              <a:t>Σ</a:t>
+            </a:r>
+            <a:r>
+              <a:rPr lang="en-US" b="0" i="0" dirty="0">
+                <a:solidFill>
+                  <a:srgbClr val="222222"/>
+                </a:solidFill>
+                <a:effectLst/>
+                <a:latin typeface="source sans pro" panose="020B0503030403020204" pitchFamily="34" charset="0"/>
+              </a:rPr>
+              <a:t>ᵢ(𝑏₀ + 𝑏₁𝑥ᵢ − 𝑦ᵢ) = mean(𝑏₀ + 𝑏₁𝑥ᵢ − 𝑦ᵢ)</a:t>
+            </a:r>
+          </a:p>
+          <a:p>
+            <a:pPr lvl="1">
+              <a:buFont typeface="+mj-lt"/>
+              <a:buAutoNum type="arabicPeriod"/>
+            </a:pPr>
+            <a:r>
+              <a:rPr lang="en-US" b="0" i="0" dirty="0">
+                <a:solidFill>
+                  <a:srgbClr val="222222"/>
+                </a:solidFill>
+                <a:effectLst/>
+                <a:latin typeface="source sans pro" panose="020B0503030403020204" pitchFamily="34" charset="0"/>
+              </a:rPr>
+              <a:t>∂𝐶/∂𝑏₁ = (1/𝑛) </a:t>
+            </a:r>
+            <a:r>
+              <a:rPr lang="el-GR" b="0" i="0" dirty="0">
+                <a:solidFill>
+                  <a:srgbClr val="222222"/>
+                </a:solidFill>
+                <a:effectLst/>
+                <a:latin typeface="source sans pro" panose="020B0503030403020204" pitchFamily="34" charset="0"/>
+              </a:rPr>
+              <a:t>Σ</a:t>
+            </a:r>
+            <a:r>
+              <a:rPr lang="en-US" b="0" i="0" dirty="0">
+                <a:solidFill>
+                  <a:srgbClr val="222222"/>
+                </a:solidFill>
+                <a:effectLst/>
+                <a:latin typeface="source sans pro" panose="020B0503030403020204" pitchFamily="34" charset="0"/>
+              </a:rPr>
+              <a:t>ᵢ(𝑏₀ + 𝑏₁𝑥ᵢ − 𝑦ᵢ) 𝑥ᵢ = mean((𝑏₀ + 𝑏₁𝑥ᵢ − 𝑦ᵢ) 𝑥ᵢ)</a:t>
+            </a:r>
+          </a:p>
+          <a:p>
+            <a:pPr algn="l"/>
+            <a:r>
+              <a:rPr lang="en-US" b="0" i="0" dirty="0">
+                <a:solidFill>
+                  <a:srgbClr val="222222"/>
+                </a:solidFill>
+                <a:effectLst/>
+                <a:latin typeface="source sans pro" panose="020B0503030403020204" pitchFamily="34" charset="0"/>
+              </a:rPr>
+              <a:t>You need the values of 𝑥 and 𝑦 to calculate the gradient of this cost function. Your gradient function will have as inputs not only 𝑏₀ and 𝑏₁ but also 𝑥 and 𝑦.</a:t>
+            </a:r>
+          </a:p>
+          <a:p>
+            <a:endParaRPr lang="ar-PS" dirty="0"/>
+          </a:p>
+        </p:txBody>
+      </p:sp>
+      <p:sp>
+        <p:nvSpPr>
+          <p:cNvPr id="6" name="TextBox 5">
+            <a:extLst>
+              <a:ext uri="{FF2B5EF4-FFF2-40B4-BE49-F238E27FC236}">
+                <a16:creationId xmlns:a16="http://schemas.microsoft.com/office/drawing/2014/main" id="{5C3D7212-1FA8-4EF5-B420-F9AAAAEC26BD}"/>
+              </a:ext>
+            </a:extLst>
+          </p:cNvPr>
+          <p:cNvSpPr txBox="1"/>
+          <p:nvPr/>
+        </p:nvSpPr>
+        <p:spPr>
+          <a:xfrm>
+            <a:off x="288758" y="4217725"/>
+            <a:ext cx="11614483" cy="1200329"/>
+          </a:xfrm>
+          <a:prstGeom prst="rect">
+            <a:avLst/>
+          </a:prstGeom>
+          <a:noFill/>
+          <a:ln>
+            <a:solidFill>
+              <a:schemeClr val="accent1"/>
+            </a:solidFill>
+          </a:ln>
+        </p:spPr>
+        <p:txBody>
+          <a:bodyPr wrap="square">
+            <a:spAutoFit/>
+          </a:bodyPr>
+          <a:lstStyle/>
+          <a:p>
+            <a:r>
+              <a:rPr lang="en-US" sz="2400" dirty="0"/>
+              <a:t>def </a:t>
+            </a:r>
+            <a:r>
+              <a:rPr lang="en-US" sz="2400" dirty="0" err="1"/>
+              <a:t>ssr_gradient</a:t>
+            </a:r>
+            <a:r>
+              <a:rPr lang="en-US" sz="2400" dirty="0"/>
+              <a:t>(x, y, b):</a:t>
+            </a:r>
+          </a:p>
+          <a:p>
+            <a:r>
+              <a:rPr lang="en-US" sz="2400" dirty="0"/>
+              <a:t>    res = b[0] + b[1] * x - y</a:t>
+            </a:r>
+          </a:p>
+          <a:p>
+            <a:r>
+              <a:rPr lang="en-US" sz="2400" dirty="0"/>
+              <a:t>    return </a:t>
+            </a:r>
+            <a:r>
+              <a:rPr lang="en-US" sz="2400" dirty="0" err="1"/>
+              <a:t>res.mean</a:t>
+            </a:r>
+            <a:r>
+              <a:rPr lang="en-US" sz="2400" dirty="0"/>
+              <a:t>(), (res * x).mean()  # .mean() is a method of </a:t>
+            </a:r>
+            <a:r>
+              <a:rPr lang="en-US" sz="2400" dirty="0" err="1"/>
+              <a:t>np.ndarray</a:t>
+            </a:r>
+            <a:endParaRPr lang="en-US" sz="2400" dirty="0"/>
+          </a:p>
+        </p:txBody>
+      </p:sp>
+      <p:sp>
+        <p:nvSpPr>
+          <p:cNvPr id="9" name="TextBox 8">
+            <a:extLst>
+              <a:ext uri="{FF2B5EF4-FFF2-40B4-BE49-F238E27FC236}">
+                <a16:creationId xmlns:a16="http://schemas.microsoft.com/office/drawing/2014/main" id="{23C0AA12-67DB-49E5-8D9E-71D79388187A}"/>
+              </a:ext>
+            </a:extLst>
+          </p:cNvPr>
+          <p:cNvSpPr txBox="1"/>
+          <p:nvPr/>
+        </p:nvSpPr>
+        <p:spPr>
+          <a:xfrm>
+            <a:off x="288759" y="5576798"/>
+            <a:ext cx="11614482" cy="1200329"/>
+          </a:xfrm>
+          <a:prstGeom prst="rect">
+            <a:avLst/>
+          </a:prstGeom>
+          <a:noFill/>
+          <a:ln>
+            <a:solidFill>
+              <a:schemeClr val="accent1"/>
+            </a:solidFill>
+          </a:ln>
+        </p:spPr>
+        <p:txBody>
+          <a:bodyPr wrap="square">
+            <a:spAutoFit/>
+          </a:bodyPr>
+          <a:lstStyle/>
+          <a:p>
+            <a:r>
+              <a:rPr lang="en-US" sz="2400" dirty="0" err="1"/>
+              <a:t>ssr_gradient</a:t>
+            </a:r>
+            <a:r>
+              <a:rPr lang="en-US" sz="2400" dirty="0"/>
+              <a:t>() takes the arrays x and y, which contain the observation inputs and outputs, and the array b that holds the current values of the decision variables 𝑏₀ and 𝑏₁ , and </a:t>
+            </a:r>
+            <a:r>
+              <a:rPr lang="en-US" sz="2400" b="0" i="0" dirty="0">
+                <a:solidFill>
+                  <a:srgbClr val="222222"/>
+                </a:solidFill>
+                <a:effectLst/>
+                <a:latin typeface="source sans pro" panose="020B0503030403020204" pitchFamily="34" charset="0"/>
+              </a:rPr>
+              <a:t>returns the pair of values of ∂𝐶/∂𝑏₀ and ∂𝐶/∂𝑏₁</a:t>
+            </a:r>
+            <a:endParaRPr lang="en-US" sz="2400" dirty="0"/>
           </a:p>
         </p:txBody>
       </p:sp>
@@ -7625,7 +8205,17 @@
           <a:bodyPr/>
           <a:lstStyle/>
           <a:p>
-            <a:endParaRPr lang="ar-PS"/>
+            <a:r>
+              <a:rPr lang="en-US" b="0" i="0" dirty="0">
+                <a:solidFill>
+                  <a:srgbClr val="222222"/>
+                </a:solidFill>
+                <a:effectLst/>
+                <a:latin typeface="source sans pro" panose="020B0503030403020204" pitchFamily="34" charset="0"/>
+              </a:rPr>
+              <a:t>Small adjustments</a:t>
+            </a:r>
+            <a:endParaRPr lang="ar-PS" dirty="0"/>
           </a:p>
         </p:txBody>
       </p:sp>
@@ -7645,12 +8235,210 @@
             <p:ph idx="1"/>
           </p:nvPr>
         </p:nvSpPr>
-        <p:spPr/>
+        <p:spPr>
+          <a:xfrm>
+            <a:off x="838200" y="1379621"/>
+            <a:ext cx="10515600" cy="4797342"/>
+          </a:xfrm>
+        </p:spPr>
         <p:txBody>
           <a:bodyPr/>
           <a:lstStyle/>
           <a:p>
-            <a:endParaRPr lang="ar-PS"/>
+            <a:r>
+              <a:rPr lang="en-US" dirty="0"/>
+              <a:t>Add x and y as the parameters of </a:t>
+            </a:r>
+            <a:r>
+              <a:rPr lang="en-US" dirty="0" err="1"/>
+              <a:t>gradient_descent</a:t>
+            </a:r>
+            <a:r>
+              <a:rPr lang="en-US" dirty="0"/>
+              <a:t>() on line 4.</a:t>
+            </a:r>
+          </a:p>
+          <a:p>
+            <a:r>
+              <a:rPr lang="en-US" dirty="0"/>
+              <a:t>Provide x and y to the gradient function and make sure you convert your gradient tuple to a NumPy array on line 8.</a:t>
+            </a:r>
+            <a:endParaRPr lang="ar-PS" dirty="0"/>
+          </a:p>
+        </p:txBody>
+      </p:sp>
+      <p:sp>
+        <p:nvSpPr>
+          <p:cNvPr id="7" name="TextBox 6">
+            <a:extLst>
+              <a:ext uri="{FF2B5EF4-FFF2-40B4-BE49-F238E27FC236}">
+                <a16:creationId xmlns:a16="http://schemas.microsoft.com/office/drawing/2014/main" id="{801E6D50-36D2-4DED-A01D-363B4600EBA8}"/>
+              </a:ext>
+            </a:extLst>
+          </p:cNvPr>
+          <p:cNvSpPr txBox="1"/>
+          <p:nvPr/>
+        </p:nvSpPr>
+        <p:spPr>
+          <a:xfrm>
+            <a:off x="1227222" y="2916135"/>
+            <a:ext cx="8686800" cy="3785652"/>
+          </a:xfrm>
+          <a:prstGeom prst="rect">
+            <a:avLst/>
+          </a:prstGeom>
+          <a:noFill/>
+          <a:ln>
+            <a:solidFill>
+              <a:schemeClr val="accent1"/>
+            </a:solidFill>
+          </a:ln>
+        </p:spPr>
+        <p:txBody>
+          <a:bodyPr wrap="square">
+            <a:spAutoFit/>
+          </a:bodyPr>
+          <a:lstStyle/>
+          <a:p>
+            <a:r>
+              <a:rPr lang="en-US" sz="2000" dirty="0"/>
+              <a:t>import </a:t>
+            </a:r>
+            <a:r>
+              <a:rPr lang="en-US" sz="2000" dirty="0" err="1"/>
+              <a:t>numpy</a:t>
+            </a:r>
+            <a:r>
+              <a:rPr lang="en-US" sz="2000" dirty="0"/>
+              <a:t> as np</a:t>
+            </a:r>
+          </a:p>
+          <a:p>
+            <a:endParaRPr lang="en-US" sz="2000" dirty="0"/>
+          </a:p>
+          <a:p>
+            <a:r>
+              <a:rPr lang="en-US" sz="2000" dirty="0"/>
+              <a:t>def </a:t>
+            </a:r>
+            <a:r>
+              <a:rPr lang="en-US" sz="2000" dirty="0" err="1"/>
+              <a:t>gradient_descent</a:t>
+            </a:r>
+            <a:r>
+              <a:rPr lang="en-US" sz="2000" dirty="0"/>
+              <a:t>(</a:t>
+            </a:r>
+          </a:p>
+          <a:p>
+            <a:r>
+              <a:rPr lang="en-US" sz="2000" dirty="0"/>
+              <a:t>    gradient, x, y, start, </a:t>
+            </a:r>
+            <a:r>
+              <a:rPr lang="en-US" sz="2000" dirty="0" err="1"/>
+              <a:t>learn_rate</a:t>
+            </a:r>
+            <a:r>
+              <a:rPr lang="en-US" sz="2000" dirty="0"/>
+              <a:t>=0.1, </a:t>
+            </a:r>
+            <a:r>
+              <a:rPr lang="en-US" sz="2000" dirty="0" err="1"/>
+              <a:t>n_iter</a:t>
+            </a:r>
+            <a:r>
+              <a:rPr lang="en-US" sz="2000" dirty="0"/>
+              <a:t>=50, tolerance=1e-06</a:t>
+            </a:r>
+          </a:p>
+          <a:p>
+            <a:r>
+              <a:rPr lang="en-US" sz="2000" dirty="0"/>
+              <a:t>):</a:t>
+            </a:r>
+          </a:p>
+          <a:p>
+            <a:r>
+              <a:rPr lang="en-US" sz="2000" dirty="0"/>
+              <a:t>    vector = start</a:t>
+            </a:r>
+          </a:p>
+          <a:p>
+            <a:r>
+              <a:rPr lang="en-US" sz="2000" dirty="0"/>
+              <a:t>    for _ in range(</a:t>
+            </a:r>
+            <a:r>
+              <a:rPr lang="en-US" sz="2000" dirty="0" err="1"/>
+              <a:t>n_iter</a:t>
+            </a:r>
+            <a:r>
+              <a:rPr lang="en-US" sz="2000" dirty="0"/>
+              <a:t>):</a:t>
+            </a:r>
+          </a:p>
+          <a:p>
+            <a:r>
+              <a:rPr lang="en-US" sz="2000" dirty="0"/>
+              <a:t>        diff = -</a:t>
+            </a:r>
+            <a:r>
+              <a:rPr lang="en-US" sz="2000" dirty="0" err="1"/>
+              <a:t>learn_rate</a:t>
+            </a:r>
+            <a:r>
+              <a:rPr lang="en-US" sz="2000" dirty="0"/>
+              <a:t> * </a:t>
+            </a:r>
+            <a:r>
+              <a:rPr lang="en-US" sz="2000" dirty="0" err="1"/>
+              <a:t>np.array</a:t>
+            </a:r>
+            <a:r>
+              <a:rPr lang="en-US" sz="2000" dirty="0"/>
+              <a:t>(gradient(x, y, vector))</a:t>
+            </a:r>
+          </a:p>
+          <a:p>
+            <a:r>
+              <a:rPr lang="en-US" sz="2000" dirty="0"/>
+              <a:t>        if </a:t>
+            </a:r>
+            <a:r>
+              <a:rPr lang="en-US" sz="2000" dirty="0" err="1"/>
+              <a:t>np.all</a:t>
+            </a:r>
+            <a:r>
+              <a:rPr lang="en-US" sz="2000" dirty="0"/>
+              <a:t>(</a:t>
+            </a:r>
+            <a:r>
+              <a:rPr lang="en-US" sz="2000" dirty="0" err="1"/>
+              <a:t>np.abs</a:t>
+            </a:r>
+            <a:r>
+              <a:rPr lang="en-US" sz="2000" dirty="0"/>
+              <a:t>(diff) &lt;= tolerance):</a:t>
+            </a:r>
+          </a:p>
+          <a:p>
+            <a:r>
+              <a:rPr lang="en-US" sz="2000" dirty="0"/>
+              <a:t>            break</a:t>
+            </a:r>
+          </a:p>
+          <a:p>
+            <a:r>
+              <a:rPr lang="en-US" sz="2000" dirty="0"/>
+              <a:t>        vector += diff</a:t>
+            </a:r>
+          </a:p>
+          <a:p>
+            <a:r>
+              <a:rPr lang="en-US" sz="2000" dirty="0"/>
+              <a:t>    return vector</a:t>
+            </a:r>
           </a:p>
         </p:txBody>
       </p:sp>
@@ -7705,32 +8493,138 @@
           <a:bodyPr/>
           <a:lstStyle/>
           <a:p>
-            <a:endParaRPr lang="ar-PS"/>
-          </a:p>
-        </p:txBody>
-      </p:sp>
-      <p:sp>
-        <p:nvSpPr>
-          <p:cNvPr id="3" name="عنصر نائب للمحتوى 2">
-            <a:extLst>
-              <a:ext uri="{FF2B5EF4-FFF2-40B4-BE49-F238E27FC236}">
-                <a16:creationId xmlns:a16="http://schemas.microsoft.com/office/drawing/2014/main" id="{B45F38F5-69B9-4D22-B485-975B8B7AAAD4}"/>
-              </a:ext>
-            </a:extLst>
-          </p:cNvPr>
-          <p:cNvSpPr>
-            <a:spLocks noGrp="1"/>
-          </p:cNvSpPr>
-          <p:nvPr>
-            <p:ph idx="1"/>
-          </p:nvPr>
-        </p:nvSpPr>
-        <p:spPr/>
-        <p:txBody>
-          <a:bodyPr/>
-          <a:lstStyle/>
-          <a:p>
-            <a:endParaRPr lang="ar-PS"/>
+            <a:r>
+              <a:rPr lang="en-US" dirty="0"/>
+              <a:t>Call the gradient function </a:t>
+            </a:r>
+            <a:endParaRPr lang="ar-PS" dirty="0"/>
+          </a:p>
+        </p:txBody>
+      </p:sp>
+      <p:sp>
+        <p:nvSpPr>
+          <p:cNvPr id="8" name="TextBox 7">
+            <a:extLst>
+              <a:ext uri="{FF2B5EF4-FFF2-40B4-BE49-F238E27FC236}">
+                <a16:creationId xmlns:a16="http://schemas.microsoft.com/office/drawing/2014/main" id="{4AD2541F-1D7F-4D68-9D12-499C7E643BB0}"/>
+              </a:ext>
+            </a:extLst>
+          </p:cNvPr>
+          <p:cNvSpPr txBox="1"/>
+          <p:nvPr/>
+        </p:nvSpPr>
+        <p:spPr>
+          <a:xfrm>
+            <a:off x="244641" y="1664871"/>
+            <a:ext cx="9910011" cy="4031873"/>
+          </a:xfrm>
+          <a:prstGeom prst="rect">
+            <a:avLst/>
+          </a:prstGeom>
+          <a:noFill/>
+          <a:ln>
+            <a:solidFill>
+              <a:schemeClr val="accent1"/>
+            </a:solidFill>
+          </a:ln>
+        </p:spPr>
+        <p:txBody>
+          <a:bodyPr wrap="square">
+            <a:spAutoFit/>
+          </a:bodyPr>
+          <a:lstStyle/>
+          <a:p>
+            <a:r>
+              <a:rPr lang="en-US" sz="3200" dirty="0"/>
+              <a:t>&gt;&gt;&gt; x = </a:t>
+            </a:r>
+            <a:r>
+              <a:rPr lang="en-US" sz="3200" dirty="0" err="1"/>
+              <a:t>np.array</a:t>
+            </a:r>
+            <a:r>
+              <a:rPr lang="en-US" sz="3200" dirty="0"/>
+              <a:t>([5, 15, 25, 35, 45, 55])</a:t>
+            </a:r>
+          </a:p>
+          <a:p>
+            <a:r>
+              <a:rPr lang="en-US" sz="3200" dirty="0"/>
+              <a:t>&gt;&gt;&gt; y = </a:t>
+            </a:r>
+            <a:r>
+              <a:rPr lang="en-US" sz="3200" dirty="0" err="1"/>
+              <a:t>np.array</a:t>
+            </a:r>
+            <a:r>
+              <a:rPr lang="en-US" sz="3200" dirty="0"/>
+              <a:t>([5, 20, 14, 32, 22, 38])</a:t>
+            </a:r>
+          </a:p>
+          <a:p>
+            <a:endParaRPr lang="en-US" sz="3200" dirty="0"/>
+          </a:p>
+          <a:p>
+            <a:r>
+              <a:rPr lang="en-US" sz="3200" dirty="0"/>
+              <a:t>&gt;&gt;&gt; </a:t>
+            </a:r>
+            <a:r>
+              <a:rPr lang="en-US" sz="3200" dirty="0" err="1"/>
+              <a:t>gradient_descent</a:t>
+            </a:r>
+            <a:r>
+              <a:rPr lang="en-US" sz="3200" dirty="0"/>
+              <a:t>(</a:t>
+            </a:r>
+          </a:p>
+          <a:p>
+            <a:r>
+              <a:rPr lang="en-US" sz="3200" dirty="0"/>
+              <a:t>...     </a:t>
+            </a:r>
+            <a:r>
+              <a:rPr lang="en-US" sz="3200" dirty="0" err="1"/>
+              <a:t>ssr_gradient</a:t>
+            </a:r>
+            <a:r>
+              <a:rPr lang="en-US" sz="3200" dirty="0"/>
+              <a:t>, x, y, start=[0.5, 0.5], </a:t>
+            </a:r>
+            <a:r>
+              <a:rPr lang="en-US" sz="3200" dirty="0" err="1"/>
+              <a:t>learn_rate</a:t>
+            </a:r>
+            <a:r>
+              <a:rPr lang="en-US" sz="3200" dirty="0"/>
+              <a:t>=0.0008,</a:t>
+            </a:r>
+          </a:p>
+          <a:p>
+            <a:r>
+              <a:rPr lang="en-US" sz="3200" dirty="0"/>
+              <a:t>...     </a:t>
+            </a:r>
+            <a:r>
+              <a:rPr lang="en-US" sz="3200" dirty="0" err="1"/>
+              <a:t>n_iter</a:t>
+            </a:r>
+            <a:r>
+              <a:rPr lang="en-US" sz="3200" dirty="0"/>
+              <a:t>=100_000</a:t>
+            </a:r>
+          </a:p>
+          <a:p>
+            <a:r>
+              <a:rPr lang="en-US" sz="3200" dirty="0"/>
+              <a:t>... )</a:t>
+            </a:r>
+          </a:p>
+          <a:p>
+            <a:r>
+              <a:rPr lang="en-US" sz="3200" dirty="0"/>
+              <a:t>array([5.62822349, 0.54012867])</a:t>
+            </a:r>
           </a:p>
         </p:txBody>
       </p:sp>
@@ -7785,7 +8679,11 @@
           <a:bodyPr/>
           <a:lstStyle/>
           <a:p>
-            <a:endParaRPr lang="ar-PS"/>
+            <a:r>
+              <a:rPr lang="en-US" dirty="0"/>
+              <a:t>Results </a:t>
+            </a:r>
+            <a:endParaRPr lang="ar-PS" dirty="0"/>
           </a:p>
         </p:txBody>
       </p:sp>
@@ -7810,7 +8708,41 @@
           <a:bodyPr/>
           <a:lstStyle/>
           <a:p>
-            <a:endParaRPr lang="ar-PS"/>
+            <a:r>
+              <a:rPr lang="en-US" b="0" i="0" dirty="0">
+                <a:solidFill>
+                  <a:srgbClr val="222222"/>
+                </a:solidFill>
+                <a:effectLst/>
+                <a:latin typeface="source sans pro" panose="020B0503030403020204" pitchFamily="34" charset="0"/>
+              </a:rPr>
+              <a:t>The result is an array with two values that correspond to the decision variables: 𝑏₀ = 5.63 and 𝑏₁ = 0.54. </a:t>
+            </a:r>
+          </a:p>
+          <a:p>
+            <a:r>
+              <a:rPr lang="en-US" b="0" i="0" dirty="0">
+                <a:solidFill>
+                  <a:srgbClr val="222222"/>
+                </a:solidFill>
+                <a:effectLst/>
+                <a:latin typeface="source sans pro" panose="020B0503030403020204" pitchFamily="34" charset="0"/>
+              </a:rPr>
+              <a:t>The best regression line is 𝑓(𝑥) = 5.63 + 0.54𝑥. </a:t>
+            </a:r>
+          </a:p>
+          <a:p>
+            <a:r>
+              <a:rPr lang="en-US" b="0" i="0" dirty="0">
+                <a:solidFill>
+                  <a:srgbClr val="222222"/>
+                </a:solidFill>
+                <a:effectLst/>
+                <a:latin typeface="source sans pro" panose="020B0503030403020204" pitchFamily="34" charset="0"/>
+              </a:rPr>
+              <a:t>As in the previous examples, this result heavily depends on the learning rate. You might not get such a good result with too low or too high of a learning rate.</a:t>
+            </a:r>
+            <a:endParaRPr lang="ar-PS" dirty="0"/>
           </a:p>
         </p:txBody>
       </p:sp>

</xml_diff>